<commit_message>
Preview of the project
</commit_message>
<xml_diff>
--- a/Python_разработка_для_БПЛА_паттерны_проектирования,_API_интерфейсы+(6).pptx
+++ b/Python_разработка_для_БПЛА_паттерны_проектирования,_API_интерфейсы+(6).pptx
@@ -292,7 +292,7 @@
       </p15:sldGuideLst>
     </p:ext>
     <p:ext uri="GoogleSlidesCustomDataVersion2">
-      <go:slidesCustomData xmlns:go="http://customooxmlschemas.google.com/" xmlns:ahyp="http://schemas.microsoft.com/office/drawing/2018/hyperlinkcolor" xmlns:p15="http://schemas.microsoft.com/office/powerpoint/2012/main" xmlns:p14="http://schemas.microsoft.com/office/powerpoint/2010/main" xmlns:com="http://schemas.openxmlformats.org/drawingml/2006/compatibility" xmlns:pvml="urn:schemas-microsoft-com:office:powerpoint" xmlns:v="urn:schemas-microsoft-com:vml" xmlns:o="urn:schemas-microsoft-com:office:office" xmlns:dgm="http://schemas.openxmlformats.org/drawingml/2006/diagram" xmlns:c="http://schemas.openxmlformats.org/drawingml/2006/chart" xmlns:mv="urn:schemas-microsoft-com:mac:vml" xmlns:mc="http://schemas.openxmlformats.org/markup-compatibility/2006" xmlns="" r:id="rId28" roundtripDataSignature="AMtx7mgXibPICmElT20R5Iy5acDRsXJ6cw=="/>
+      <go:slidesCustomData xmlns="" xmlns:mc="http://schemas.openxmlformats.org/markup-compatibility/2006" xmlns:mv="urn:schemas-microsoft-com:mac:vml" xmlns:c="http://schemas.openxmlformats.org/drawingml/2006/chart" xmlns:dgm="http://schemas.openxmlformats.org/drawingml/2006/diagram" xmlns:o="urn:schemas-microsoft-com:office:office" xmlns:v="urn:schemas-microsoft-com:vml" xmlns:pvml="urn:schemas-microsoft-com:office:powerpoint" xmlns:com="http://schemas.openxmlformats.org/drawingml/2006/compatibility" xmlns:p14="http://schemas.microsoft.com/office/powerpoint/2010/main" xmlns:p15="http://schemas.microsoft.com/office/powerpoint/2012/main" xmlns:ahyp="http://schemas.microsoft.com/office/drawing/2018/hyperlinkcolor" xmlns:go="http://customooxmlschemas.google.com/" r:id="rId28" roundtripDataSignature="AMtx7mgXibPICmElT20R5Iy5acDRsXJ6cw=="/>
     </p:ext>
   </p:extLst>
 </p:presentation>
@@ -11308,8 +11308,8 @@
         </p:nvSpPr>
         <p:spPr>
           <a:xfrm>
-            <a:off x="311700" y="832700"/>
-            <a:ext cx="4913400" cy="346200"/>
+            <a:off x="423333" y="832700"/>
+            <a:ext cx="8331200" cy="1543469"/>
           </a:xfrm>
           <a:prstGeom prst="rect">
             <a:avLst/>
@@ -11325,7 +11325,7 @@
           </a:bodyPr>
           <a:lstStyle/>
           <a:p>
-            <a:pPr marL="0" marR="0" lvl="0" indent="0" algn="l" rtl="0">
+            <a:pPr lvl="0">
               <a:lnSpc>
                 <a:spcPct val="115000"/>
               </a:lnSpc>
@@ -11335,15 +11335,10 @@
               <a:spcAft>
                 <a:spcPts val="1200"/>
               </a:spcAft>
-              <a:buClr>
-                <a:srgbClr val="000000"/>
-              </a:buClr>
               <a:buSzPts val="1050"/>
-              <a:buFont typeface="Arial"/>
-              <a:buNone/>
             </a:pPr>
             <a:r>
-              <a:rPr lang="ru" sz="1050" b="1" i="1" u="none" strike="noStrike" cap="none">
+              <a:rPr lang="ru-RU" sz="1050" b="1" i="1" dirty="0">
                 <a:solidFill>
                   <a:srgbClr val="11696D"/>
                 </a:solidFill>
@@ -11352,9 +11347,131 @@
                 <a:cs typeface="Montserrat"/>
                 <a:sym typeface="Montserrat"/>
               </a:rPr>
-              <a:t>Описание</a:t>
-            </a:r>
-            <a:endParaRPr sz="1050" b="1" i="1" u="none" strike="noStrike" cap="none">
+              <a:t>Серверный код использует несколько продвинутых паттернов проектирования, таких как </a:t>
+            </a:r>
+            <a:r>
+              <a:rPr lang="ru-RU" sz="1050" b="1" i="1" dirty="0" err="1">
+                <a:solidFill>
+                  <a:srgbClr val="11696D"/>
+                </a:solidFill>
+                <a:latin typeface="Montserrat"/>
+                <a:ea typeface="Montserrat"/>
+                <a:cs typeface="Montserrat"/>
+                <a:sym typeface="Montserrat"/>
+              </a:rPr>
+              <a:t>Singleton</a:t>
+            </a:r>
+            <a:r>
+              <a:rPr lang="ru-RU" sz="1050" b="1" i="1" dirty="0">
+                <a:solidFill>
+                  <a:srgbClr val="11696D"/>
+                </a:solidFill>
+                <a:latin typeface="Montserrat"/>
+                <a:ea typeface="Montserrat"/>
+                <a:cs typeface="Montserrat"/>
+                <a:sym typeface="Montserrat"/>
+              </a:rPr>
+              <a:t> и </a:t>
+            </a:r>
+            <a:r>
+              <a:rPr lang="ru-RU" sz="1050" b="1" i="1" dirty="0" err="1">
+                <a:solidFill>
+                  <a:srgbClr val="11696D"/>
+                </a:solidFill>
+                <a:latin typeface="Montserrat"/>
+                <a:ea typeface="Montserrat"/>
+                <a:cs typeface="Montserrat"/>
+                <a:sym typeface="Montserrat"/>
+              </a:rPr>
+              <a:t>Observer</a:t>
+            </a:r>
+            <a:r>
+              <a:rPr lang="ru-RU" sz="1050" b="1" i="1" dirty="0">
+                <a:solidFill>
+                  <a:srgbClr val="11696D"/>
+                </a:solidFill>
+                <a:latin typeface="Montserrat"/>
+                <a:ea typeface="Montserrat"/>
+                <a:cs typeface="Montserrat"/>
+                <a:sym typeface="Montserrat"/>
+              </a:rPr>
+              <a:t>, а также управляет асинхронными операциями через </a:t>
+            </a:r>
+            <a:r>
+              <a:rPr lang="ru-RU" sz="1050" b="1" i="1" dirty="0" err="1">
+                <a:solidFill>
+                  <a:srgbClr val="11696D"/>
+                </a:solidFill>
+                <a:latin typeface="Montserrat"/>
+                <a:ea typeface="Montserrat"/>
+                <a:cs typeface="Montserrat"/>
+                <a:sym typeface="Montserrat"/>
+              </a:rPr>
+              <a:t>asyncio</a:t>
+            </a:r>
+            <a:r>
+              <a:rPr lang="ru-RU" sz="1050" b="1" i="1" dirty="0">
+                <a:solidFill>
+                  <a:srgbClr val="11696D"/>
+                </a:solidFill>
+                <a:latin typeface="Montserrat"/>
+                <a:ea typeface="Montserrat"/>
+                <a:cs typeface="Montserrat"/>
+                <a:sym typeface="Montserrat"/>
+              </a:rPr>
+              <a:t>. Всё работает через </a:t>
+            </a:r>
+            <a:r>
+              <a:rPr lang="ru-RU" sz="1050" b="1" i="1" dirty="0" err="1">
+                <a:solidFill>
+                  <a:srgbClr val="11696D"/>
+                </a:solidFill>
+                <a:latin typeface="Montserrat"/>
+                <a:ea typeface="Montserrat"/>
+                <a:cs typeface="Montserrat"/>
+                <a:sym typeface="Montserrat"/>
+              </a:rPr>
+              <a:t>WebSocket</a:t>
+            </a:r>
+            <a:r>
+              <a:rPr lang="ru-RU" sz="1050" b="1" i="1" dirty="0">
+                <a:solidFill>
+                  <a:srgbClr val="11696D"/>
+                </a:solidFill>
+                <a:latin typeface="Montserrat"/>
+                <a:ea typeface="Montserrat"/>
+                <a:cs typeface="Montserrat"/>
+                <a:sym typeface="Montserrat"/>
+              </a:rPr>
+              <a:t>-соединения, где обрабатываются команды от операторов и дронов. </a:t>
+            </a:r>
+          </a:p>
+          <a:p>
+            <a:pPr lvl="0">
+              <a:lnSpc>
+                <a:spcPct val="115000"/>
+              </a:lnSpc>
+              <a:spcBef>
+                <a:spcPts val="1200"/>
+              </a:spcBef>
+              <a:spcAft>
+                <a:spcPts val="1200"/>
+              </a:spcAft>
+              <a:buSzPts val="1050"/>
+            </a:pPr>
+            <a:r>
+              <a:rPr lang="ru-RU" sz="1050" b="1" i="1" dirty="0">
+                <a:solidFill>
+                  <a:srgbClr val="11696D"/>
+                </a:solidFill>
+                <a:latin typeface="Montserrat"/>
+                <a:ea typeface="Montserrat"/>
+                <a:cs typeface="Montserrat"/>
+                <a:sym typeface="Montserrat"/>
+              </a:rPr>
+              <a:t>Для обеспечения стабильности добавляем тесты на авторизацию, отправку команд и обработку статусов.</a:t>
+            </a:r>
+            <a:endParaRPr sz="1050" b="1" i="1" u="none" strike="noStrike" cap="none" dirty="0">
               <a:solidFill>
                 <a:srgbClr val="11696D"/>
               </a:solidFill>
@@ -15571,7 +15688,7 @@
         <p:spPr>
           <a:xfrm>
             <a:off x="286050" y="1111250"/>
-            <a:ext cx="8546200" cy="1978973"/>
+            <a:ext cx="8546200" cy="2966166"/>
           </a:xfrm>
           <a:prstGeom prst="rect">
             <a:avLst/>
@@ -15649,6 +15766,27 @@
               </a:rPr>
               <a:t> и современных веб-технологий. Веб-сайт включает в себя пользовательский интерфейс, взаимодействующий с серверной частью через API-интерфейсы. Основное внимание уделяется масштабируемости, безопасности и производительности системы.</a:t>
             </a:r>
+            <a:endParaRPr lang="en-US" sz="1050" dirty="0">
+              <a:solidFill>
+                <a:srgbClr val="11696D"/>
+              </a:solidFill>
+              <a:latin typeface="Montserrat"/>
+              <a:sym typeface="Times New Roman"/>
+            </a:endParaRPr>
+          </a:p>
+          <a:p>
+            <a:pPr lvl="0">
+              <a:lnSpc>
+                <a:spcPct val="115000"/>
+              </a:lnSpc>
+              <a:spcBef>
+                <a:spcPts val="1200"/>
+              </a:spcBef>
+              <a:spcAft>
+                <a:spcPts val="1200"/>
+              </a:spcAft>
+              <a:buSzPts val="1050"/>
+            </a:pPr>
             <a:br>
               <a:rPr lang="ru-RU" sz="1050" dirty="0">
                 <a:solidFill>
@@ -15698,6 +15836,27 @@
               </a:rPr>
               <a:t>  </a:t>
             </a:r>
+            <a:endParaRPr lang="en-US" sz="1050" b="1" i="1" dirty="0">
+              <a:solidFill>
+                <a:srgbClr val="11696D"/>
+              </a:solidFill>
+              <a:latin typeface="Montserrat"/>
+              <a:sym typeface="Times New Roman"/>
+            </a:endParaRPr>
+          </a:p>
+          <a:p>
+            <a:pPr lvl="0">
+              <a:lnSpc>
+                <a:spcPct val="115000"/>
+              </a:lnSpc>
+              <a:spcBef>
+                <a:spcPts val="1200"/>
+              </a:spcBef>
+              <a:spcAft>
+                <a:spcPts val="1200"/>
+              </a:spcAft>
+              <a:buSzPts val="1050"/>
+            </a:pPr>
             <a:br>
               <a:rPr lang="ru-RU" sz="1050" b="1" i="1" dirty="0">
                 <a:solidFill>

</xml_diff>